<commit_message>
--수행 목록 - Plan Service 구현완료
</commit_message>
<xml_diff>
--- a/src/main/resources/Guide/스프링부트로 재고관리 프로그램 제작하기.pptx
+++ b/src/main/resources/Guide/스프링부트로 재고관리 프로그램 제작하기.pptx
@@ -227,7 +227,7 @@
           <a:effectLst/>
           <a:extLst>
             <a:ext uri="{91240B29-F687-4f45-9708-019B960494DF}">
-              <a14:hiddenLine xmlns="" xmlns:a14="http://schemas.microsoft.com/office/drawing/2010/main" w="9525">
+              <a14:hiddenLine xmlns:a14="http://schemas.microsoft.com/office/drawing/2010/main" xmlns="" w="9525">
                 <a:solidFill>
                   <a:srgbClr val="000000"/>
                 </a:solidFill>
@@ -1749,7 +1749,7 @@
           <a:ln/>
           <a:extLst>
             <a:ext uri="{91240B29-F687-4f45-9708-019B960494DF}">
-              <a14:hiddenLine xmlns="" xmlns:a14="http://schemas.microsoft.com/office/drawing/2010/main" w="9525">
+              <a14:hiddenLine xmlns:a14="http://schemas.microsoft.com/office/drawing/2010/main" xmlns="" w="9525">
                 <a:solidFill>
                   <a:srgbClr val="000000"/>
                 </a:solidFill>
@@ -2024,7 +2024,7 @@
           <a:ln/>
           <a:extLst>
             <a:ext uri="{91240B29-F687-4f45-9708-019B960494DF}">
-              <a14:hiddenLine xmlns="" xmlns:a14="http://schemas.microsoft.com/office/drawing/2010/main" w="9525">
+              <a14:hiddenLine xmlns:a14="http://schemas.microsoft.com/office/drawing/2010/main" xmlns="" w="9525">
                 <a:solidFill>
                   <a:srgbClr val="000000"/>
                 </a:solidFill>
@@ -2307,7 +2307,7 @@
           <a:ln/>
           <a:extLst>
             <a:ext uri="{91240B29-F687-4f45-9708-019B960494DF}">
-              <a14:hiddenLine xmlns="" xmlns:a14="http://schemas.microsoft.com/office/drawing/2010/main" w="9525">
+              <a14:hiddenLine xmlns:a14="http://schemas.microsoft.com/office/drawing/2010/main" xmlns="" w="9525">
                 <a:solidFill>
                   <a:srgbClr val="000000"/>
                 </a:solidFill>
@@ -2933,7 +2933,7 @@
           <a:ln/>
           <a:extLst>
             <a:ext uri="{91240B29-F687-4f45-9708-019B960494DF}">
-              <a14:hiddenLine xmlns="" xmlns:a14="http://schemas.microsoft.com/office/drawing/2010/main" w="9525">
+              <a14:hiddenLine xmlns:a14="http://schemas.microsoft.com/office/drawing/2010/main" xmlns="" w="9525">
                 <a:solidFill>
                   <a:srgbClr val="000000"/>
                 </a:solidFill>
@@ -3272,7 +3272,7 @@
           <a:ln/>
           <a:extLst>
             <a:ext uri="{91240B29-F687-4f45-9708-019B960494DF}">
-              <a14:hiddenLine xmlns="" xmlns:a14="http://schemas.microsoft.com/office/drawing/2010/main" w="9525">
+              <a14:hiddenLine xmlns:a14="http://schemas.microsoft.com/office/drawing/2010/main" xmlns="" w="9525">
                 <a:solidFill>
                   <a:srgbClr val="000000"/>
                 </a:solidFill>
@@ -3749,7 +3749,7 @@
           <a:ln/>
           <a:extLst>
             <a:ext uri="{91240B29-F687-4f45-9708-019B960494DF}">
-              <a14:hiddenLine xmlns="" xmlns:a14="http://schemas.microsoft.com/office/drawing/2010/main" w="9525">
+              <a14:hiddenLine xmlns:a14="http://schemas.microsoft.com/office/drawing/2010/main" xmlns="" w="9525">
                 <a:solidFill>
                   <a:srgbClr val="000000"/>
                 </a:solidFill>
@@ -4178,7 +4178,7 @@
           <a:ln/>
           <a:extLst>
             <a:ext uri="{91240B29-F687-4f45-9708-019B960494DF}">
-              <a14:hiddenLine xmlns="" xmlns:a14="http://schemas.microsoft.com/office/drawing/2010/main" w="9525">
+              <a14:hiddenLine xmlns:a14="http://schemas.microsoft.com/office/drawing/2010/main" xmlns="" w="9525">
                 <a:solidFill>
                   <a:srgbClr val="000000"/>
                 </a:solidFill>
@@ -8884,10 +8884,10 @@
       </p:sp>
       <p:pic>
         <p:nvPicPr>
-          <p:cNvPr id="5" name="그림 4">
+          <p:cNvPr id="4" name="그림 3">
             <a:extLst>
               <a:ext uri="{FF2B5EF4-FFF2-40B4-BE49-F238E27FC236}">
-                <a16:creationId xmlns:a16="http://schemas.microsoft.com/office/drawing/2014/main" id="{926859AC-1E15-D383-CF73-8EE7808D964E}"/>
+                <a16:creationId xmlns:a16="http://schemas.microsoft.com/office/drawing/2014/main" id="{5A4B3566-3EF4-375D-9C86-F88A2C99EBF8}"/>
               </a:ext>
             </a:extLst>
           </p:cNvPr>
@@ -8904,42 +8904,26 @@
         </p:blipFill>
         <p:spPr>
           <a:xfrm>
-            <a:off x="1812340" y="1684402"/>
-            <a:ext cx="7998925" cy="4568806"/>
+            <a:off x="1929190" y="1592648"/>
+            <a:ext cx="7882075" cy="4619138"/>
           </a:xfrm>
           <a:prstGeom prst="rect">
             <a:avLst/>
           </a:prstGeom>
-          <a:solidFill>
-            <a:srgbClr val="FFFFFF">
-              <a:shade val="85000"/>
-            </a:srgbClr>
-          </a:solidFill>
-          <a:ln w="190500" cap="sq">
+          <a:ln w="38100" cap="sq">
             <a:solidFill>
-              <a:srgbClr val="FFFFFF"/>
+              <a:srgbClr val="000000"/>
             </a:solidFill>
+            <a:prstDash val="solid"/>
             <a:miter lim="800000"/>
           </a:ln>
           <a:effectLst>
-            <a:outerShdw blurRad="55000" dist="18000" dir="5400000" algn="tl" rotWithShape="0">
+            <a:outerShdw blurRad="50800" dist="38100" dir="2700000" algn="tl" rotWithShape="0">
               <a:srgbClr val="000000">
-                <a:alpha val="40000"/>
+                <a:alpha val="43000"/>
               </a:srgbClr>
             </a:outerShdw>
           </a:effectLst>
-          <a:scene3d>
-            <a:camera prst="orthographicFront"/>
-            <a:lightRig rig="twoPt" dir="t">
-              <a:rot lat="0" lon="0" rev="7200000"/>
-            </a:lightRig>
-          </a:scene3d>
-          <a:sp3d>
-            <a:bevelT w="25400" h="19050"/>
-            <a:contourClr>
-              <a:srgbClr val="FFFFFF"/>
-            </a:contourClr>
-          </a:sp3d>
         </p:spPr>
       </p:pic>
     </p:spTree>

</xml_diff>